<commit_message>
update optional items and presos
</commit_message>
<xml_diff>
--- a/Networking.pptx
+++ b/Networking.pptx
@@ -3050,7 +3050,7 @@
                   <a:prstClr val="black"/>
                 </a:solidFill>
               </a:rPr>
-              <a:t>3/30/21 2:36 AM</a:t>
+              <a:t>3/30/21 12:04 PM</a:t>
             </a:fld>
             <a:endParaRPr lang="en-US" dirty="0">
               <a:solidFill>
@@ -20116,6 +20116,178 @@
           <a:chExt cx="0" cy="0"/>
         </a:xfrm>
       </p:grpSpPr>
+      <p:sp>
+        <p:nvSpPr>
+          <p:cNvPr id="2" name="TextBox 1">
+            <a:extLst>
+              <a:ext uri="{FF2B5EF4-FFF2-40B4-BE49-F238E27FC236}">
+                <a16:creationId xmlns:a16="http://schemas.microsoft.com/office/drawing/2014/main" id="{B1D69680-3815-FF4E-8537-F47C260D24A8}"/>
+              </a:ext>
+            </a:extLst>
+          </p:cNvPr>
+          <p:cNvSpPr txBox="1"/>
+          <p:nvPr/>
+        </p:nvSpPr>
+        <p:spPr>
+          <a:xfrm>
+            <a:off x="192741" y="174812"/>
+            <a:ext cx="11806517" cy="2659190"/>
+          </a:xfrm>
+          <a:prstGeom prst="rect">
+            <a:avLst/>
+          </a:prstGeom>
+          <a:noFill/>
+        </p:spPr>
+        <p:txBody>
+          <a:bodyPr wrap="square" lIns="182880" tIns="146304" rIns="182880" bIns="146304" rtlCol="0">
+            <a:spAutoFit/>
+          </a:bodyPr>
+          <a:lstStyle/>
+          <a:p>
+            <a:pPr>
+              <a:lnSpc>
+                <a:spcPct val="90000"/>
+              </a:lnSpc>
+              <a:spcAft>
+                <a:spcPts val="600"/>
+              </a:spcAft>
+            </a:pPr>
+            <a:r>
+              <a:rPr lang="en-US" sz="4000" dirty="0">
+                <a:gradFill>
+                  <a:gsLst>
+                    <a:gs pos="2917">
+                      <a:schemeClr val="tx1"/>
+                    </a:gs>
+                    <a:gs pos="30000">
+                      <a:schemeClr val="tx1"/>
+                    </a:gs>
+                  </a:gsLst>
+                  <a:lin ang="5400000" scaled="0"/>
+                </a:gradFill>
+              </a:rPr>
+              <a:t>Lets get started:</a:t>
+            </a:r>
+          </a:p>
+          <a:p>
+            <a:pPr>
+              <a:lnSpc>
+                <a:spcPct val="90000"/>
+              </a:lnSpc>
+              <a:spcAft>
+                <a:spcPts val="600"/>
+              </a:spcAft>
+            </a:pPr>
+            <a:endParaRPr lang="en-US" sz="2400" dirty="0">
+              <a:gradFill>
+                <a:gsLst>
+                  <a:gs pos="2917">
+                    <a:schemeClr val="tx1"/>
+                  </a:gs>
+                  <a:gs pos="30000">
+                    <a:schemeClr val="tx1"/>
+                  </a:gs>
+                </a:gsLst>
+                <a:lin ang="5400000" scaled="0"/>
+              </a:gradFill>
+            </a:endParaRPr>
+          </a:p>
+          <a:p>
+            <a:pPr>
+              <a:lnSpc>
+                <a:spcPct val="90000"/>
+              </a:lnSpc>
+              <a:spcAft>
+                <a:spcPts val="600"/>
+              </a:spcAft>
+            </a:pPr>
+            <a:r>
+              <a:rPr lang="en-US" sz="6600" dirty="0" err="1">
+                <a:gradFill>
+                  <a:gsLst>
+                    <a:gs pos="2917">
+                      <a:schemeClr val="tx1"/>
+                    </a:gs>
+                    <a:gs pos="30000">
+                      <a:schemeClr val="tx1"/>
+                    </a:gs>
+                  </a:gsLst>
+                  <a:lin ang="5400000" scaled="0"/>
+                </a:gradFill>
+              </a:rPr>
+              <a:t>aka.ms</a:t>
+            </a:r>
+            <a:r>
+              <a:rPr lang="en-US" sz="6600" dirty="0">
+                <a:gradFill>
+                  <a:gsLst>
+                    <a:gs pos="2917">
+                      <a:schemeClr val="tx1"/>
+                    </a:gs>
+                    <a:gs pos="30000">
+                      <a:schemeClr val="tx1"/>
+                    </a:gs>
+                  </a:gsLst>
+                  <a:lin ang="5400000" scaled="0"/>
+                </a:gradFill>
+              </a:rPr>
+              <a:t>/</a:t>
+            </a:r>
+            <a:r>
+              <a:rPr lang="en-US" sz="6600" dirty="0" err="1">
+                <a:gradFill>
+                  <a:gsLst>
+                    <a:gs pos="2917">
+                      <a:schemeClr val="tx1"/>
+                    </a:gs>
+                    <a:gs pos="30000">
+                      <a:schemeClr val="tx1"/>
+                    </a:gs>
+                  </a:gsLst>
+                  <a:lin ang="5400000" scaled="0"/>
+                </a:gradFill>
+              </a:rPr>
+              <a:t>AzureFundamentalsLab</a:t>
+            </a:r>
+            <a:endParaRPr lang="en-US" sz="6600" dirty="0">
+              <a:gradFill>
+                <a:gsLst>
+                  <a:gs pos="2917">
+                    <a:schemeClr val="tx1"/>
+                  </a:gs>
+                  <a:gs pos="30000">
+                    <a:schemeClr val="tx1"/>
+                  </a:gs>
+                </a:gsLst>
+                <a:lin ang="5400000" scaled="0"/>
+              </a:gradFill>
+            </a:endParaRPr>
+          </a:p>
+          <a:p>
+            <a:pPr>
+              <a:lnSpc>
+                <a:spcPct val="90000"/>
+              </a:lnSpc>
+              <a:spcAft>
+                <a:spcPts val="600"/>
+              </a:spcAft>
+            </a:pPr>
+            <a:endParaRPr lang="en-US" sz="2400" dirty="0">
+              <a:gradFill>
+                <a:gsLst>
+                  <a:gs pos="2917">
+                    <a:schemeClr val="tx1"/>
+                  </a:gs>
+                  <a:gs pos="30000">
+                    <a:schemeClr val="tx1"/>
+                  </a:gs>
+                </a:gsLst>
+                <a:lin ang="5400000" scaled="0"/>
+              </a:gradFill>
+            </a:endParaRPr>
+          </a:p>
+        </p:txBody>
+      </p:sp>
     </p:spTree>
     <p:extLst>
       <p:ext uri="{BB962C8B-B14F-4D97-AF65-F5344CB8AC3E}">

</xml_diff>